<commit_message>
Minor changes to the S3 poster
</commit_message>
<xml_diff>
--- a/S3 Poster/Multifidelity aeroelastic optimization with application to a BWB.pptx
+++ b/S3 Poster/Multifidelity aeroelastic optimization with application to a BWB.pptx
@@ -11333,7 +11333,7 @@
               <a:pPr>
                 <a:defRPr/>
               </a:pPr>
-              <a:t>13/10/2019</a:t>
+              <a:t>15/10/2019</a:t>
             </a:fld>
             <a:endParaRPr lang="pt-BR"/>
           </a:p>
@@ -11546,7 +11546,7 @@
               <a:pPr>
                 <a:defRPr/>
               </a:pPr>
-              <a:t>13/10/2019</a:t>
+              <a:t>15/10/2019</a:t>
             </a:fld>
             <a:endParaRPr lang="pt-BR"/>
           </a:p>
@@ -11769,7 +11769,7 @@
               <a:pPr>
                 <a:defRPr/>
               </a:pPr>
-              <a:t>13/10/2019</a:t>
+              <a:t>15/10/2019</a:t>
             </a:fld>
             <a:endParaRPr lang="pt-BR"/>
           </a:p>
@@ -11982,7 +11982,7 @@
               <a:pPr>
                 <a:defRPr/>
               </a:pPr>
-              <a:t>13/10/2019</a:t>
+              <a:t>15/10/2019</a:t>
             </a:fld>
             <a:endParaRPr lang="pt-BR"/>
           </a:p>
@@ -12272,7 +12272,7 @@
               <a:pPr>
                 <a:defRPr/>
               </a:pPr>
-              <a:t>13/10/2019</a:t>
+              <a:t>15/10/2019</a:t>
             </a:fld>
             <a:endParaRPr lang="pt-BR"/>
           </a:p>
@@ -12602,7 +12602,7 @@
               <a:pPr>
                 <a:defRPr/>
               </a:pPr>
-              <a:t>13/10/2019</a:t>
+              <a:t>15/10/2019</a:t>
             </a:fld>
             <a:endParaRPr lang="pt-BR"/>
           </a:p>
@@ -13071,7 +13071,7 @@
               <a:pPr>
                 <a:defRPr/>
               </a:pPr>
-              <a:t>13/10/2019</a:t>
+              <a:t>15/10/2019</a:t>
             </a:fld>
             <a:endParaRPr lang="pt-BR"/>
           </a:p>
@@ -13233,7 +13233,7 @@
               <a:pPr>
                 <a:defRPr/>
               </a:pPr>
-              <a:t>13/10/2019</a:t>
+              <a:t>15/10/2019</a:t>
             </a:fld>
             <a:endParaRPr lang="pt-BR"/>
           </a:p>
@@ -13373,7 +13373,7 @@
               <a:pPr>
                 <a:defRPr/>
               </a:pPr>
-              <a:t>13/10/2019</a:t>
+              <a:t>15/10/2019</a:t>
             </a:fld>
             <a:endParaRPr lang="pt-BR"/>
           </a:p>
@@ -13693,7 +13693,7 @@
               <a:pPr>
                 <a:defRPr/>
               </a:pPr>
-              <a:t>13/10/2019</a:t>
+              <a:t>15/10/2019</a:t>
             </a:fld>
             <a:endParaRPr lang="pt-BR"/>
           </a:p>
@@ -13993,7 +13993,7 @@
               <a:pPr>
                 <a:defRPr/>
               </a:pPr>
-              <a:t>13/10/2019</a:t>
+              <a:t>15/10/2019</a:t>
             </a:fld>
             <a:endParaRPr lang="pt-BR"/>
           </a:p>
@@ -14318,7 +14318,7 @@
               <a:pPr>
                 <a:defRPr/>
               </a:pPr>
-              <a:t>13/10/2019</a:t>
+              <a:t>15/10/2019</a:t>
             </a:fld>
             <a:endParaRPr lang="pt-BR"/>
           </a:p>
@@ -15229,7 +15229,7 @@
         </p:nvSpPr>
         <p:spPr bwMode="auto">
           <a:xfrm>
-            <a:off x="126073" y="791786"/>
+            <a:off x="126073" y="1049747"/>
             <a:ext cx="21104669" cy="2994658"/>
           </a:xfrm>
           <a:prstGeom prst="rect">
@@ -15532,581 +15532,6 @@
       </p:sp>
       <p:sp>
         <p:nvSpPr>
-          <p:cNvPr id="58" name="Rectangle 57">
-            <a:extLst>
-              <a:ext uri="{FF2B5EF4-FFF2-40B4-BE49-F238E27FC236}">
-                <a16:creationId xmlns:a16="http://schemas.microsoft.com/office/drawing/2014/main" id="{E3FFBFE1-D895-4096-9C18-5EF37196B1EF}"/>
-              </a:ext>
-            </a:extLst>
-          </p:cNvPr>
-          <p:cNvSpPr/>
-          <p:nvPr/>
-        </p:nvSpPr>
-        <p:spPr>
-          <a:xfrm>
-            <a:off x="10338739" y="19509400"/>
-            <a:ext cx="11000382" cy="1200329"/>
-          </a:xfrm>
-          <a:prstGeom prst="rect">
-            <a:avLst/>
-          </a:prstGeom>
-        </p:spPr>
-        <p:txBody>
-          <a:bodyPr wrap="square">
-            <a:spAutoFit/>
-          </a:bodyPr>
-          <a:lstStyle/>
-          <a:p>
-            <a:pPr algn="just"/>
-            <a:r>
-              <a:rPr lang="es-MX" sz="1200" b="1" dirty="0">
-                <a:solidFill>
-                  <a:srgbClr val="002060"/>
-                </a:solidFill>
-                <a:latin typeface="+mj-lt"/>
-              </a:rPr>
-              <a:t>[1] Gray, J., Moore, K., &amp; </a:t>
-            </a:r>
-            <a:r>
-              <a:rPr lang="es-MX" sz="1200" b="1" dirty="0" err="1">
-                <a:solidFill>
-                  <a:srgbClr val="002060"/>
-                </a:solidFill>
-                <a:latin typeface="+mj-lt"/>
-              </a:rPr>
-              <a:t>Naylor</a:t>
-            </a:r>
-            <a:r>
-              <a:rPr lang="es-MX" sz="1200" b="1" dirty="0">
-                <a:solidFill>
-                  <a:srgbClr val="002060"/>
-                </a:solidFill>
-                <a:latin typeface="+mj-lt"/>
-              </a:rPr>
-              <a:t>, B. (2010, </a:t>
-            </a:r>
-            <a:r>
-              <a:rPr lang="es-MX" sz="1200" b="1" dirty="0" err="1">
-                <a:solidFill>
-                  <a:srgbClr val="002060"/>
-                </a:solidFill>
-                <a:latin typeface="+mj-lt"/>
-              </a:rPr>
-              <a:t>September</a:t>
-            </a:r>
-            <a:r>
-              <a:rPr lang="es-MX" sz="1200" b="1" dirty="0">
-                <a:solidFill>
-                  <a:srgbClr val="002060"/>
-                </a:solidFill>
-                <a:latin typeface="+mj-lt"/>
-              </a:rPr>
-              <a:t>). </a:t>
-            </a:r>
-            <a:r>
-              <a:rPr lang="es-MX" sz="1200" b="1" dirty="0" err="1">
-                <a:solidFill>
-                  <a:srgbClr val="002060"/>
-                </a:solidFill>
-                <a:latin typeface="+mj-lt"/>
-              </a:rPr>
-              <a:t>OpenMDAO</a:t>
-            </a:r>
-            <a:r>
-              <a:rPr lang="es-MX" sz="1200" b="1" dirty="0">
-                <a:solidFill>
-                  <a:srgbClr val="002060"/>
-                </a:solidFill>
-                <a:latin typeface="+mj-lt"/>
-              </a:rPr>
-              <a:t>: </a:t>
-            </a:r>
-            <a:r>
-              <a:rPr lang="es-MX" sz="1200" b="1" dirty="0" err="1">
-                <a:solidFill>
-                  <a:srgbClr val="002060"/>
-                </a:solidFill>
-                <a:latin typeface="+mj-lt"/>
-              </a:rPr>
-              <a:t>An</a:t>
-            </a:r>
-            <a:r>
-              <a:rPr lang="es-MX" sz="1200" b="1" dirty="0">
-                <a:solidFill>
-                  <a:srgbClr val="002060"/>
-                </a:solidFill>
-                <a:latin typeface="+mj-lt"/>
-              </a:rPr>
-              <a:t> open </a:t>
-            </a:r>
-            <a:r>
-              <a:rPr lang="es-MX" sz="1200" b="1" dirty="0" err="1">
-                <a:solidFill>
-                  <a:srgbClr val="002060"/>
-                </a:solidFill>
-                <a:latin typeface="+mj-lt"/>
-              </a:rPr>
-              <a:t>source</a:t>
-            </a:r>
-            <a:r>
-              <a:rPr lang="es-MX" sz="1200" b="1" dirty="0">
-                <a:solidFill>
-                  <a:srgbClr val="002060"/>
-                </a:solidFill>
-                <a:latin typeface="+mj-lt"/>
-              </a:rPr>
-              <a:t> </a:t>
-            </a:r>
-            <a:r>
-              <a:rPr lang="es-MX" sz="1200" b="1" dirty="0" err="1">
-                <a:solidFill>
-                  <a:srgbClr val="002060"/>
-                </a:solidFill>
-                <a:latin typeface="+mj-lt"/>
-              </a:rPr>
-              <a:t>framework</a:t>
-            </a:r>
-            <a:r>
-              <a:rPr lang="es-MX" sz="1200" b="1" dirty="0">
-                <a:solidFill>
-                  <a:srgbClr val="002060"/>
-                </a:solidFill>
-                <a:latin typeface="+mj-lt"/>
-              </a:rPr>
-              <a:t> </a:t>
-            </a:r>
-            <a:r>
-              <a:rPr lang="es-MX" sz="1200" b="1" dirty="0" err="1">
-                <a:solidFill>
-                  <a:srgbClr val="002060"/>
-                </a:solidFill>
-                <a:latin typeface="+mj-lt"/>
-              </a:rPr>
-              <a:t>for</a:t>
-            </a:r>
-            <a:r>
-              <a:rPr lang="es-MX" sz="1200" b="1" dirty="0">
-                <a:solidFill>
-                  <a:srgbClr val="002060"/>
-                </a:solidFill>
-                <a:latin typeface="+mj-lt"/>
-              </a:rPr>
-              <a:t> </a:t>
-            </a:r>
-            <a:r>
-              <a:rPr lang="es-MX" sz="1200" b="1" dirty="0" err="1">
-                <a:solidFill>
-                  <a:srgbClr val="002060"/>
-                </a:solidFill>
-                <a:latin typeface="+mj-lt"/>
-              </a:rPr>
-              <a:t>multidisciplinary</a:t>
-            </a:r>
-            <a:r>
-              <a:rPr lang="es-MX" sz="1200" b="1" dirty="0">
-                <a:solidFill>
-                  <a:srgbClr val="002060"/>
-                </a:solidFill>
-                <a:latin typeface="+mj-lt"/>
-              </a:rPr>
-              <a:t> </a:t>
-            </a:r>
-            <a:r>
-              <a:rPr lang="es-MX" sz="1200" b="1" dirty="0" err="1">
-                <a:solidFill>
-                  <a:srgbClr val="002060"/>
-                </a:solidFill>
-                <a:latin typeface="+mj-lt"/>
-              </a:rPr>
-              <a:t>analysis</a:t>
-            </a:r>
-            <a:r>
-              <a:rPr lang="es-MX" sz="1200" b="1" dirty="0">
-                <a:solidFill>
-                  <a:srgbClr val="002060"/>
-                </a:solidFill>
-                <a:latin typeface="+mj-lt"/>
-              </a:rPr>
-              <a:t> and </a:t>
-            </a:r>
-            <a:r>
-              <a:rPr lang="es-MX" sz="1200" b="1" dirty="0" err="1">
-                <a:solidFill>
-                  <a:srgbClr val="002060"/>
-                </a:solidFill>
-                <a:latin typeface="+mj-lt"/>
-              </a:rPr>
-              <a:t>optimization</a:t>
-            </a:r>
-            <a:r>
-              <a:rPr lang="es-MX" sz="1200" b="1" dirty="0">
-                <a:solidFill>
-                  <a:srgbClr val="002060"/>
-                </a:solidFill>
-                <a:latin typeface="+mj-lt"/>
-              </a:rPr>
-              <a:t>. In 13th AIAA/ISSMO </a:t>
-            </a:r>
-            <a:r>
-              <a:rPr lang="es-MX" sz="1200" b="1" dirty="0" err="1">
-                <a:solidFill>
-                  <a:srgbClr val="002060"/>
-                </a:solidFill>
-                <a:latin typeface="+mj-lt"/>
-              </a:rPr>
-              <a:t>Multidisciplinary</a:t>
-            </a:r>
-            <a:r>
-              <a:rPr lang="es-MX" sz="1200" b="1" dirty="0">
-                <a:solidFill>
-                  <a:srgbClr val="002060"/>
-                </a:solidFill>
-                <a:latin typeface="+mj-lt"/>
-              </a:rPr>
-              <a:t> </a:t>
-            </a:r>
-            <a:r>
-              <a:rPr lang="es-MX" sz="1200" b="1" dirty="0" err="1">
-                <a:solidFill>
-                  <a:srgbClr val="002060"/>
-                </a:solidFill>
-                <a:latin typeface="+mj-lt"/>
-              </a:rPr>
-              <a:t>Analysis</a:t>
-            </a:r>
-            <a:r>
-              <a:rPr lang="es-MX" sz="1200" b="1" dirty="0">
-                <a:solidFill>
-                  <a:srgbClr val="002060"/>
-                </a:solidFill>
-                <a:latin typeface="+mj-lt"/>
-              </a:rPr>
-              <a:t> </a:t>
-            </a:r>
-            <a:r>
-              <a:rPr lang="es-MX" sz="1200" b="1" dirty="0" err="1">
-                <a:solidFill>
-                  <a:srgbClr val="002060"/>
-                </a:solidFill>
-                <a:latin typeface="+mj-lt"/>
-              </a:rPr>
-              <a:t>Optimization</a:t>
-            </a:r>
-            <a:r>
-              <a:rPr lang="es-MX" sz="1200" b="1" dirty="0">
-                <a:solidFill>
-                  <a:srgbClr val="002060"/>
-                </a:solidFill>
-                <a:latin typeface="+mj-lt"/>
-              </a:rPr>
-              <a:t> </a:t>
-            </a:r>
-            <a:r>
-              <a:rPr lang="es-MX" sz="1200" b="1" dirty="0" err="1">
-                <a:solidFill>
-                  <a:srgbClr val="002060"/>
-                </a:solidFill>
-                <a:latin typeface="+mj-lt"/>
-              </a:rPr>
-              <a:t>Conference</a:t>
-            </a:r>
-            <a:r>
-              <a:rPr lang="es-MX" sz="1200" b="1" dirty="0">
-                <a:solidFill>
-                  <a:srgbClr val="002060"/>
-                </a:solidFill>
-                <a:latin typeface="+mj-lt"/>
-              </a:rPr>
-              <a:t> (p. 9101).</a:t>
-            </a:r>
-            <a:endParaRPr lang="en-US" sz="1200" b="1" dirty="0">
-              <a:solidFill>
-                <a:srgbClr val="002060"/>
-              </a:solidFill>
-              <a:latin typeface="+mn-lt"/>
-            </a:endParaRPr>
-          </a:p>
-          <a:p>
-            <a:r>
-              <a:rPr lang="en-GB" sz="1200" b="1" dirty="0">
-                <a:solidFill>
-                  <a:srgbClr val="002060"/>
-                </a:solidFill>
-                <a:latin typeface="+mn-lt"/>
-              </a:rPr>
-              <a:t>[2] </a:t>
-            </a:r>
-            <a:r>
-              <a:rPr lang="en-GB" sz="1200" b="1" dirty="0" err="1">
-                <a:solidFill>
-                  <a:srgbClr val="002060"/>
-                </a:solidFill>
-                <a:latin typeface="+mn-lt"/>
-              </a:rPr>
-              <a:t>Peherstorfer</a:t>
-            </a:r>
-            <a:r>
-              <a:rPr lang="en-GB" sz="1200" b="1" dirty="0">
-                <a:solidFill>
-                  <a:srgbClr val="002060"/>
-                </a:solidFill>
-                <a:latin typeface="+mn-lt"/>
-              </a:rPr>
-              <a:t>, B., Willcox, K., &amp; </a:t>
-            </a:r>
-            <a:r>
-              <a:rPr lang="en-GB" sz="1200" b="1" dirty="0" err="1">
-                <a:solidFill>
-                  <a:srgbClr val="002060"/>
-                </a:solidFill>
-                <a:latin typeface="+mn-lt"/>
-              </a:rPr>
-              <a:t>Gunzburger</a:t>
-            </a:r>
-            <a:r>
-              <a:rPr lang="en-GB" sz="1200" b="1" dirty="0">
-                <a:solidFill>
-                  <a:srgbClr val="002060"/>
-                </a:solidFill>
-                <a:latin typeface="+mn-lt"/>
-              </a:rPr>
-              <a:t>, M. (2018). Survey of </a:t>
-            </a:r>
-            <a:r>
-              <a:rPr lang="en-GB" sz="1200" b="1" dirty="0" err="1">
-                <a:solidFill>
-                  <a:srgbClr val="002060"/>
-                </a:solidFill>
-                <a:latin typeface="+mn-lt"/>
-              </a:rPr>
-              <a:t>multifidelity</a:t>
-            </a:r>
-            <a:r>
-              <a:rPr lang="en-GB" sz="1200" b="1" dirty="0">
-                <a:solidFill>
-                  <a:srgbClr val="002060"/>
-                </a:solidFill>
-                <a:latin typeface="+mn-lt"/>
-              </a:rPr>
-              <a:t> methods in uncertainty propagation, inference, and optimization. SIAM Review, 60(3),            550-591.</a:t>
-            </a:r>
-            <a:endParaRPr lang="en-US" sz="1200" b="1" dirty="0">
-              <a:solidFill>
-                <a:srgbClr val="002060"/>
-              </a:solidFill>
-              <a:latin typeface="+mn-lt"/>
-            </a:endParaRPr>
-          </a:p>
-          <a:p>
-            <a:pPr algn="just"/>
-            <a:r>
-              <a:rPr lang="es-MX" sz="1200" b="1" dirty="0">
-                <a:solidFill>
-                  <a:srgbClr val="002060"/>
-                </a:solidFill>
-                <a:latin typeface="+mn-lt"/>
-              </a:rPr>
-              <a:t>[3] Mas-Colomer, J. (2018). </a:t>
-            </a:r>
-            <a:r>
-              <a:rPr lang="es-MX" sz="1200" b="1" i="1" dirty="0" err="1">
-                <a:solidFill>
-                  <a:srgbClr val="002060"/>
-                </a:solidFill>
-                <a:latin typeface="+mn-lt"/>
-              </a:rPr>
-              <a:t>Aeroelastic</a:t>
-            </a:r>
-            <a:r>
-              <a:rPr lang="es-MX" sz="1200" b="1" i="1" dirty="0">
-                <a:solidFill>
-                  <a:srgbClr val="002060"/>
-                </a:solidFill>
-                <a:latin typeface="+mn-lt"/>
-              </a:rPr>
-              <a:t> </a:t>
-            </a:r>
-            <a:r>
-              <a:rPr lang="es-MX" sz="1200" b="1" i="1" dirty="0" err="1">
-                <a:solidFill>
-                  <a:srgbClr val="002060"/>
-                </a:solidFill>
-                <a:latin typeface="+mn-lt"/>
-              </a:rPr>
-              <a:t>Similarity</a:t>
-            </a:r>
-            <a:r>
-              <a:rPr lang="es-MX" sz="1200" b="1" i="1" dirty="0">
-                <a:solidFill>
-                  <a:srgbClr val="002060"/>
-                </a:solidFill>
-                <a:latin typeface="+mn-lt"/>
-              </a:rPr>
-              <a:t> </a:t>
-            </a:r>
-            <a:r>
-              <a:rPr lang="es-MX" sz="1200" b="1" i="1" dirty="0" err="1">
-                <a:solidFill>
-                  <a:srgbClr val="002060"/>
-                </a:solidFill>
-                <a:latin typeface="+mn-lt"/>
-              </a:rPr>
-              <a:t>of</a:t>
-            </a:r>
-            <a:r>
-              <a:rPr lang="es-MX" sz="1200" b="1" i="1" dirty="0">
-                <a:solidFill>
-                  <a:srgbClr val="002060"/>
-                </a:solidFill>
-                <a:latin typeface="+mn-lt"/>
-              </a:rPr>
-              <a:t> a Flight </a:t>
-            </a:r>
-            <a:r>
-              <a:rPr lang="es-MX" sz="1200" b="1" i="1" dirty="0" err="1">
-                <a:solidFill>
-                  <a:srgbClr val="002060"/>
-                </a:solidFill>
-                <a:latin typeface="+mn-lt"/>
-              </a:rPr>
-              <a:t>Demonstrator</a:t>
-            </a:r>
-            <a:r>
-              <a:rPr lang="es-MX" sz="1200" b="1" i="1" dirty="0">
-                <a:solidFill>
-                  <a:srgbClr val="002060"/>
-                </a:solidFill>
-                <a:latin typeface="+mn-lt"/>
-              </a:rPr>
-              <a:t> </a:t>
-            </a:r>
-            <a:r>
-              <a:rPr lang="es-MX" sz="1200" b="1" i="1" dirty="0" err="1">
-                <a:solidFill>
-                  <a:srgbClr val="002060"/>
-                </a:solidFill>
-                <a:latin typeface="+mn-lt"/>
-              </a:rPr>
-              <a:t>via</a:t>
-            </a:r>
-            <a:r>
-              <a:rPr lang="es-MX" sz="1200" b="1" i="1" dirty="0">
-                <a:solidFill>
-                  <a:srgbClr val="002060"/>
-                </a:solidFill>
-                <a:latin typeface="+mn-lt"/>
-              </a:rPr>
-              <a:t> </a:t>
-            </a:r>
-            <a:r>
-              <a:rPr lang="es-MX" sz="1200" b="1" i="1" dirty="0" err="1">
-                <a:solidFill>
-                  <a:srgbClr val="002060"/>
-                </a:solidFill>
-                <a:latin typeface="+mn-lt"/>
-              </a:rPr>
-              <a:t>Multidisciplinary</a:t>
-            </a:r>
-            <a:r>
-              <a:rPr lang="es-MX" sz="1200" b="1" i="1" dirty="0">
-                <a:solidFill>
-                  <a:srgbClr val="002060"/>
-                </a:solidFill>
-                <a:latin typeface="+mn-lt"/>
-              </a:rPr>
-              <a:t> </a:t>
-            </a:r>
-            <a:r>
-              <a:rPr lang="es-MX" sz="1200" b="1" i="1" dirty="0" err="1">
-                <a:solidFill>
-                  <a:srgbClr val="002060"/>
-                </a:solidFill>
-                <a:latin typeface="+mn-lt"/>
-              </a:rPr>
-              <a:t>Optimization</a:t>
-            </a:r>
-            <a:r>
-              <a:rPr lang="es-MX" sz="1200" b="1" dirty="0">
-                <a:solidFill>
-                  <a:srgbClr val="002060"/>
-                </a:solidFill>
-                <a:latin typeface="+mn-lt"/>
-              </a:rPr>
-              <a:t> (Doctoral </a:t>
-            </a:r>
-            <a:r>
-              <a:rPr lang="es-MX" sz="1200" b="1" dirty="0" err="1">
-                <a:solidFill>
-                  <a:srgbClr val="002060"/>
-                </a:solidFill>
-                <a:latin typeface="+mn-lt"/>
-              </a:rPr>
-              <a:t>dissertation</a:t>
-            </a:r>
-            <a:r>
-              <a:rPr lang="es-MX" sz="1200" b="1" dirty="0">
-                <a:solidFill>
-                  <a:srgbClr val="002060"/>
-                </a:solidFill>
-                <a:latin typeface="+mn-lt"/>
-              </a:rPr>
-              <a:t>, </a:t>
-            </a:r>
-            <a:r>
-              <a:rPr lang="es-MX" sz="1200" b="1" dirty="0" err="1">
-                <a:solidFill>
-                  <a:srgbClr val="002060"/>
-                </a:solidFill>
-                <a:latin typeface="+mn-lt"/>
-              </a:rPr>
-              <a:t>Université</a:t>
-            </a:r>
-            <a:r>
-              <a:rPr lang="es-MX" sz="1200" b="1" dirty="0">
-                <a:solidFill>
-                  <a:srgbClr val="002060"/>
-                </a:solidFill>
-                <a:latin typeface="+mn-lt"/>
-              </a:rPr>
-              <a:t> </a:t>
-            </a:r>
-            <a:r>
-              <a:rPr lang="es-MX" sz="1200" b="1" dirty="0" err="1">
-                <a:solidFill>
-                  <a:srgbClr val="002060"/>
-                </a:solidFill>
-                <a:latin typeface="+mn-lt"/>
-              </a:rPr>
-              <a:t>Fédérale</a:t>
-            </a:r>
-            <a:r>
-              <a:rPr lang="es-MX" sz="1200" b="1" dirty="0">
-                <a:solidFill>
-                  <a:srgbClr val="002060"/>
-                </a:solidFill>
-                <a:latin typeface="+mn-lt"/>
-              </a:rPr>
-              <a:t> de Toulouse).</a:t>
-            </a:r>
-            <a:endParaRPr lang="en-US" sz="1200" b="1" dirty="0">
-              <a:solidFill>
-                <a:srgbClr val="002060"/>
-              </a:solidFill>
-              <a:latin typeface="+mn-lt"/>
-            </a:endParaRPr>
-          </a:p>
-          <a:p>
-            <a:endParaRPr lang="en-US" sz="1200" dirty="0">
-              <a:solidFill>
-                <a:srgbClr val="002060"/>
-              </a:solidFill>
-              <a:latin typeface="+mj-lt"/>
-            </a:endParaRPr>
-          </a:p>
-        </p:txBody>
-      </p:sp>
-      <p:sp>
-        <p:nvSpPr>
           <p:cNvPr id="44" name="Rectangle: Rounded Corners 43">
             <a:extLst>
               <a:ext uri="{FF2B5EF4-FFF2-40B4-BE49-F238E27FC236}">
@@ -16435,7 +15860,7 @@
         </p:nvGrpSpPr>
         <p:grpSpPr>
           <a:xfrm>
-            <a:off x="-679102" y="19886165"/>
+            <a:off x="-679102" y="20067708"/>
             <a:ext cx="19107407" cy="10187609"/>
             <a:chOff x="1152264" y="19938300"/>
             <a:chExt cx="19065469" cy="10187609"/>
@@ -17198,8 +16623,8 @@
         </p:nvSpPr>
         <p:spPr>
           <a:xfrm>
-            <a:off x="306044" y="5267296"/>
-            <a:ext cx="10107955" cy="6645304"/>
+            <a:off x="112986" y="5246500"/>
+            <a:ext cx="10585176" cy="6645304"/>
           </a:xfrm>
           <a:prstGeom prst="roundRect">
             <a:avLst/>
@@ -17233,40 +16658,82 @@
           <a:bodyPr rtlCol="0" anchor="ctr"/>
           <a:lstStyle/>
           <a:p>
-            <a:pPr algn="just"/>
+            <a:pPr marL="457200" indent="-457200" algn="just">
+              <a:buFont typeface="Arial" panose="020B0604020202020204" pitchFamily="34" charset="0"/>
+              <a:buChar char="•"/>
+            </a:pPr>
             <a:r>
               <a:rPr lang="en-GB" sz="3200" dirty="0">
                 <a:solidFill>
                   <a:srgbClr val="002060"/>
                 </a:solidFill>
               </a:rPr>
-              <a:t>Aerospace design requires the consideration of fluid-structure interaction from the early stages of the project. MDO libraries allow the user to couple both disciplines and optimize with respect to established bounds and variables [1].</a:t>
+              <a:t>Fluid-Structure interaction optimization problems are often hard to solve. </a:t>
             </a:r>
           </a:p>
           <a:p>
-            <a:pPr algn="just"/>
+            <a:pPr marL="457200" indent="-457200" algn="just">
+              <a:buFont typeface="Arial" panose="020B0604020202020204" pitchFamily="34" charset="0"/>
+              <a:buChar char="•"/>
+            </a:pPr>
             <a:r>
               <a:rPr lang="en-GB" sz="3200" dirty="0">
                 <a:solidFill>
                   <a:srgbClr val="002060"/>
                 </a:solidFill>
               </a:rPr>
-              <a:t>High-Fidelity simulations offer accurate results but are often too expensive for direct design optimizations.</a:t>
-            </a:r>
-          </a:p>
-          <a:p>
-            <a:pPr algn="just"/>
+              <a:t>MDO libraries allow the user to couple both disciplines and optimize </a:t>
+            </a:r>
+            <a:r>
+              <a:rPr lang="en-GB" sz="3200" dirty="0" err="1">
+                <a:solidFill>
+                  <a:srgbClr val="002060"/>
+                </a:solidFill>
+              </a:rPr>
+              <a:t>w.r.t.</a:t>
+            </a:r>
             <a:r>
               <a:rPr lang="en-GB" sz="3200" dirty="0">
                 <a:solidFill>
                   <a:srgbClr val="002060"/>
                 </a:solidFill>
               </a:rPr>
-              <a:t>Low-Fidelity analysis offer reasonable approximations with low computational demands.</a:t>
+              <a:t> established bounds and variables [1].</a:t>
             </a:r>
           </a:p>
           <a:p>
-            <a:pPr algn="just"/>
+            <a:pPr marL="457200" indent="-457200" algn="just">
+              <a:buFont typeface="Arial" panose="020B0604020202020204" pitchFamily="34" charset="0"/>
+              <a:buChar char="•"/>
+            </a:pPr>
+            <a:r>
+              <a:rPr lang="en-GB" sz="3200" dirty="0">
+                <a:solidFill>
+                  <a:srgbClr val="002060"/>
+                </a:solidFill>
+              </a:rPr>
+              <a:t>Hi-Fi simulations offer accurate results but are often too expensive for direct design optimizations.</a:t>
+            </a:r>
+          </a:p>
+          <a:p>
+            <a:pPr marL="457200" indent="-457200" algn="just">
+              <a:buFont typeface="Arial" panose="020B0604020202020204" pitchFamily="34" charset="0"/>
+              <a:buChar char="•"/>
+            </a:pPr>
+            <a:r>
+              <a:rPr lang="en-GB" sz="3200" dirty="0">
+                <a:solidFill>
+                  <a:srgbClr val="002060"/>
+                </a:solidFill>
+              </a:rPr>
+              <a:t>Lo-Fi analysis offer reasonable approximations with low computational demands.</a:t>
+            </a:r>
+          </a:p>
+          <a:p>
+            <a:pPr marL="457200" indent="-457200" algn="just">
+              <a:buFont typeface="Arial" panose="020B0604020202020204" pitchFamily="34" charset="0"/>
+              <a:buChar char="•"/>
+            </a:pPr>
             <a:r>
               <a:rPr lang="en-GB" sz="3200" dirty="0" err="1">
                 <a:solidFill>
@@ -17281,7 +16748,21 @@
                   <a:srgbClr val="002060"/>
                 </a:solidFill>
               </a:rPr>
-              <a:t> methods leverage error and costs to speedup simulations [2]. The purpose of this work is to implement the aforementioned techniques to the development of a BWB concept aircraft.</a:t>
+              <a:t> methods leverage error and costs to speedup simulations [2]. </a:t>
+            </a:r>
+          </a:p>
+          <a:p>
+            <a:pPr marL="457200" indent="-457200" algn="just">
+              <a:buFont typeface="Arial" panose="020B0604020202020204" pitchFamily="34" charset="0"/>
+              <a:buChar char="•"/>
+            </a:pPr>
+            <a:r>
+              <a:rPr lang="en-GB" sz="3200" dirty="0">
+                <a:solidFill>
+                  <a:srgbClr val="002060"/>
+                </a:solidFill>
+              </a:rPr>
+              <a:t>The purpose of this work is to implement the aforementioned techniques to the development of a BWB concept aircraft.</a:t>
             </a:r>
           </a:p>
         </p:txBody>
@@ -17657,8 +17138,8 @@
         </p:nvSpPr>
         <p:spPr>
           <a:xfrm>
-            <a:off x="306045" y="13189421"/>
-            <a:ext cx="10032078" cy="6680492"/>
+            <a:off x="306044" y="13189420"/>
+            <a:ext cx="10392117" cy="7000552"/>
           </a:xfrm>
           <a:prstGeom prst="roundRect">
             <a:avLst/>
@@ -17692,17 +17173,20 @@
           <a:bodyPr rtlCol="0" anchor="ctr"/>
           <a:lstStyle/>
           <a:p>
-            <a:pPr algn="just"/>
-            <a:r>
-              <a:rPr lang="en-GB" sz="3200" dirty="0">
+            <a:pPr marL="457200" indent="-457200" algn="just">
+              <a:buFont typeface="Arial" panose="020B0604020202020204" pitchFamily="34" charset="0"/>
+              <a:buChar char="•"/>
+            </a:pPr>
+            <a:r>
+              <a:rPr lang="en-GB" sz="3100" dirty="0">
                 <a:solidFill>
                   <a:srgbClr val="002060"/>
                 </a:solidFill>
               </a:rPr>
-              <a:t>The main base for the development of this project is the aerostructures python package [3], which facilitates the creation of MDA and MDAO problems in </a:t>
-            </a:r>
-            <a:r>
-              <a:rPr lang="en-GB" sz="3200" dirty="0" err="1">
+              <a:t>The base for the code development is the aerostructures package [3], which facilitates the creation of MDAO problems in </a:t>
+            </a:r>
+            <a:r>
+              <a:rPr lang="en-GB" sz="3100" dirty="0" err="1">
                 <a:solidFill>
                   <a:srgbClr val="002060"/>
                 </a:solidFill>
@@ -17710,7 +17194,7 @@
               <a:t>OpenMDAO</a:t>
             </a:r>
             <a:r>
-              <a:rPr lang="en-GB" sz="3200" dirty="0">
+              <a:rPr lang="en-GB" sz="3100" dirty="0">
                 <a:solidFill>
                   <a:srgbClr val="002060"/>
                 </a:solidFill>
@@ -17720,8 +17204,19 @@
           </a:p>
           <a:p>
             <a:pPr algn="just"/>
-            <a:r>
-              <a:rPr lang="en-GB" sz="3200" dirty="0">
+            <a:endParaRPr lang="en-GB" sz="3100" dirty="0">
+              <a:solidFill>
+                <a:srgbClr val="002060"/>
+              </a:solidFill>
+            </a:endParaRPr>
+          </a:p>
+          <a:p>
+            <a:pPr marL="457200" indent="-457200" algn="just">
+              <a:buFont typeface="Arial" panose="020B0604020202020204" pitchFamily="34" charset="0"/>
+              <a:buChar char="•"/>
+            </a:pPr>
+            <a:r>
+              <a:rPr lang="en-GB" sz="3100" dirty="0">
                 <a:solidFill>
                   <a:srgbClr val="002060"/>
                 </a:solidFill>
@@ -17729,7 +17224,7 @@
               <a:t>Open-source structural (NASTRAN)  and fluid solvers (</a:t>
             </a:r>
             <a:r>
-              <a:rPr lang="en-GB" sz="3200" dirty="0" err="1">
+              <a:rPr lang="en-GB" sz="3100" dirty="0" err="1">
                 <a:solidFill>
                   <a:srgbClr val="002060"/>
                 </a:solidFill>
@@ -17737,7 +17232,7 @@
               <a:t>Panair</a:t>
             </a:r>
             <a:r>
-              <a:rPr lang="en-GB" sz="3200" dirty="0">
+              <a:rPr lang="en-GB" sz="3100" dirty="0">
                 <a:solidFill>
                   <a:srgbClr val="002060"/>
                 </a:solidFill>
@@ -17745,7 +17240,7 @@
               <a:t>, </a:t>
             </a:r>
             <a:r>
-              <a:rPr lang="en-GB" sz="3200" dirty="0" err="1">
+              <a:rPr lang="en-GB" sz="3100" dirty="0" err="1">
                 <a:solidFill>
                   <a:srgbClr val="002060"/>
                 </a:solidFill>
@@ -17753,39 +17248,88 @@
               <a:t>ADFlow</a:t>
             </a:r>
             <a:r>
-              <a:rPr lang="en-GB" sz="3200" dirty="0">
+              <a:rPr lang="en-GB" sz="3100" dirty="0">
                 <a:solidFill>
                   <a:srgbClr val="002060"/>
                 </a:solidFill>
               </a:rPr>
-              <a:t>) are coupled via the displacement field of the structure, and then optimized with respect to the induced drag (see Fig. 1).</a:t>
-            </a:r>
-          </a:p>
-          <a:p>
-            <a:pPr algn="just"/>
-            <a:r>
-              <a:rPr lang="en-GB" sz="3200" dirty="0">
+              <a:t>) are coupled via the displacement field of the structure, then optimized </a:t>
+            </a:r>
+            <a:r>
+              <a:rPr lang="en-GB" sz="3100" dirty="0" err="1">
                 <a:solidFill>
                   <a:srgbClr val="002060"/>
                 </a:solidFill>
               </a:rPr>
-              <a:t>At this stage, the same solver (</a:t>
-            </a:r>
-            <a:r>
-              <a:rPr lang="en-GB" sz="3200" dirty="0" err="1">
+              <a:t>w.r.t.</a:t>
+            </a:r>
+            <a:r>
+              <a:rPr lang="en-GB" sz="3100" dirty="0">
                 <a:solidFill>
                   <a:srgbClr val="002060"/>
                 </a:solidFill>
               </a:rPr>
-              <a:t>Panair</a:t>
-            </a:r>
-            <a:r>
-              <a:rPr lang="en-GB" sz="3200" dirty="0">
+              <a:t> </a:t>
+            </a:r>
+            <a:r>
+              <a:rPr lang="en-GB" sz="3100" dirty="0" err="1">
                 <a:solidFill>
                   <a:srgbClr val="002060"/>
                 </a:solidFill>
               </a:rPr>
-              <a:t>) is used for both fidelities and the only difference between then is the size of the fluid mesh. The philosophy behind this temporary choice is to build a progressively complex model, making sure that everything works at each step.</a:t>
+              <a:t>CDi</a:t>
+            </a:r>
+            <a:r>
+              <a:rPr lang="en-GB" sz="3100" dirty="0">
+                <a:solidFill>
+                  <a:srgbClr val="002060"/>
+                </a:solidFill>
+              </a:rPr>
+              <a:t> (Fig. 1).</a:t>
+            </a:r>
+          </a:p>
+          <a:p>
+            <a:pPr algn="just"/>
+            <a:endParaRPr lang="en-GB" sz="3100" dirty="0">
+              <a:solidFill>
+                <a:srgbClr val="002060"/>
+              </a:solidFill>
+            </a:endParaRPr>
+          </a:p>
+          <a:p>
+            <a:pPr marL="457200" indent="-457200" algn="just">
+              <a:buFont typeface="Arial" panose="020B0604020202020204" pitchFamily="34" charset="0"/>
+              <a:buChar char="•"/>
+            </a:pPr>
+            <a:r>
+              <a:rPr lang="en-GB" sz="3100" dirty="0">
+                <a:solidFill>
+                  <a:srgbClr val="002060"/>
+                </a:solidFill>
+              </a:rPr>
+              <a:t>At this stage the only difference between fidelities then is the size of the fluid mesh. </a:t>
+            </a:r>
+          </a:p>
+          <a:p>
+            <a:pPr algn="just"/>
+            <a:endParaRPr lang="en-GB" sz="3100" dirty="0">
+              <a:solidFill>
+                <a:srgbClr val="002060"/>
+              </a:solidFill>
+            </a:endParaRPr>
+          </a:p>
+          <a:p>
+            <a:pPr marL="457200" indent="-457200" algn="just">
+              <a:buFont typeface="Arial" panose="020B0604020202020204" pitchFamily="34" charset="0"/>
+              <a:buChar char="•"/>
+            </a:pPr>
+            <a:r>
+              <a:rPr lang="en-GB" sz="3100" dirty="0">
+                <a:solidFill>
+                  <a:srgbClr val="002060"/>
+                </a:solidFill>
+              </a:rPr>
+              <a:t>The philosophy is to build a progressively complex model, making sure that everything works at each step.</a:t>
             </a:r>
           </a:p>
         </p:txBody>
@@ -17804,8 +17348,8 @@
         </p:nvSpPr>
         <p:spPr>
           <a:xfrm>
-            <a:off x="11172385" y="5365538"/>
-            <a:ext cx="9850282" cy="5700718"/>
+            <a:off x="10986032" y="5364215"/>
+            <a:ext cx="10259439" cy="5700718"/>
           </a:xfrm>
           <a:prstGeom prst="roundRect">
             <a:avLst/>
@@ -17839,25 +17383,91 @@
           <a:bodyPr rtlCol="0" anchor="ctr"/>
           <a:lstStyle/>
           <a:p>
-            <a:pPr algn="just"/>
+            <a:pPr marL="457200" indent="-457200" algn="just">
+              <a:buFont typeface="Arial" panose="020B0604020202020204" pitchFamily="34" charset="0"/>
+              <a:buChar char="•"/>
+            </a:pPr>
             <a:r>
               <a:rPr lang="en-GB" sz="3200" dirty="0">
                 <a:solidFill>
                   <a:srgbClr val="002060"/>
                 </a:solidFill>
               </a:rPr>
-              <a:t>After successfully linking both fidelity methods via the displacement field, different iteration limits were set at the Lo-Fi levels to evaluate the evolution of the total execution time for the sample problem. Fig. 2 shows the combination of iterations required for convergence of the linked MDA as well as the time to converge. </a:t>
+              <a:t>Different iteration limits were set at the Lo-Fi levels to evaluate the evolution of the total execution time for a sample problem. </a:t>
             </a:r>
           </a:p>
           <a:p>
-            <a:pPr algn="just"/>
+            <a:pPr marL="457200" indent="-457200" algn="just">
+              <a:buFont typeface="Arial" panose="020B0604020202020204" pitchFamily="34" charset="0"/>
+              <a:buChar char="•"/>
+            </a:pPr>
             <a:r>
               <a:rPr lang="en-GB" sz="3200" dirty="0">
                 <a:solidFill>
                   <a:srgbClr val="002060"/>
                 </a:solidFill>
               </a:rPr>
-              <a:t>This plot suggests that accelerating the process is possible and further experimentation will be carried out to go from an iteration-based control to a residual-based control for optimum performance. The resulting shape and stress field is similar for all cases (Fig. 3).</a:t>
+              <a:t>Fig. 2 shows the combination of iterations required for convergence of the linked MDA as well as the time to converge. </a:t>
+            </a:r>
+          </a:p>
+          <a:p>
+            <a:pPr marL="457200" indent="-457200" algn="just">
+              <a:buFont typeface="Arial" panose="020B0604020202020204" pitchFamily="34" charset="0"/>
+              <a:buChar char="•"/>
+            </a:pPr>
+            <a:r>
+              <a:rPr lang="en-GB" sz="3200" dirty="0">
+                <a:solidFill>
+                  <a:srgbClr val="002060"/>
+                </a:solidFill>
+              </a:rPr>
+              <a:t>Accelerating the process is possible. </a:t>
+            </a:r>
+          </a:p>
+          <a:p>
+            <a:pPr marL="457200" indent="-457200" algn="just">
+              <a:buFont typeface="Arial" panose="020B0604020202020204" pitchFamily="34" charset="0"/>
+              <a:buChar char="•"/>
+            </a:pPr>
+            <a:r>
+              <a:rPr lang="en-GB" sz="3200" dirty="0">
+                <a:solidFill>
+                  <a:srgbClr val="002060"/>
+                </a:solidFill>
+              </a:rPr>
+              <a:t>Iteration-based control </a:t>
+            </a:r>
+            <a:r>
+              <a:rPr lang="en-GB" sz="3200" dirty="0">
+                <a:solidFill>
+                  <a:srgbClr val="002060"/>
+                </a:solidFill>
+                <a:latin typeface="Times New Roman" panose="02020603050405020304" pitchFamily="18" charset="0"/>
+                <a:cs typeface="Times New Roman" panose="02020603050405020304" pitchFamily="18" charset="0"/>
+              </a:rPr>
+              <a:t>→ </a:t>
+            </a:r>
+            <a:r>
+              <a:rPr lang="en-GB" sz="3200" dirty="0">
+                <a:solidFill>
+                  <a:srgbClr val="002060"/>
+                </a:solidFill>
+              </a:rPr>
+              <a:t>residual-based control for optimum performance. </a:t>
+            </a:r>
+          </a:p>
+          <a:p>
+            <a:pPr marL="457200" indent="-457200" algn="just">
+              <a:buFont typeface="Arial" panose="020B0604020202020204" pitchFamily="34" charset="0"/>
+              <a:buChar char="•"/>
+            </a:pPr>
+            <a:r>
+              <a:rPr lang="en-GB" sz="3200" dirty="0">
+                <a:solidFill>
+                  <a:srgbClr val="002060"/>
+                </a:solidFill>
+              </a:rPr>
+              <a:t>The resulting shape and stress field is similar for all cases (Fig. 3).</a:t>
             </a:r>
           </a:p>
         </p:txBody>
@@ -17892,55 +17502,6 @@
           <a:xfrm>
             <a:off x="14417467" y="20534237"/>
             <a:ext cx="6828005" cy="3898214"/>
-          </a:xfrm>
-          <a:prstGeom prst="roundRect">
-            <a:avLst>
-              <a:gd name="adj" fmla="val 8594"/>
-            </a:avLst>
-          </a:prstGeom>
-          <a:solidFill>
-            <a:srgbClr val="FFFFFF">
-              <a:shade val="85000"/>
-            </a:srgbClr>
-          </a:solidFill>
-          <a:ln>
-            <a:noFill/>
-          </a:ln>
-          <a:effectLst>
-            <a:reflection blurRad="12700" stA="38000" endPos="28000" dist="5000" dir="5400000" sy="-100000" algn="bl" rotWithShape="0"/>
-          </a:effectLst>
-        </p:spPr>
-      </p:pic>
-      <p:pic>
-        <p:nvPicPr>
-          <p:cNvPr id="16" name="Picture 15">
-            <a:extLst>
-              <a:ext uri="{FF2B5EF4-FFF2-40B4-BE49-F238E27FC236}">
-                <a16:creationId xmlns:a16="http://schemas.microsoft.com/office/drawing/2014/main" id="{0055DCAB-DD88-42DD-9A9D-8E7D6A9B38A9}"/>
-              </a:ext>
-            </a:extLst>
-          </p:cNvPr>
-          <p:cNvPicPr>
-            <a:picLocks noChangeAspect="1"/>
-          </p:cNvPicPr>
-          <p:nvPr/>
-        </p:nvPicPr>
-        <p:blipFill>
-          <a:blip r:embed="rId19" cstate="print">
-            <a:extLst>
-              <a:ext uri="{28A0092B-C50C-407E-A947-70E740481C1C}">
-                <a14:useLocalDpi xmlns:a14="http://schemas.microsoft.com/office/drawing/2010/main" val="0"/>
-              </a:ext>
-            </a:extLst>
-          </a:blip>
-          <a:stretch>
-            <a:fillRect/>
-          </a:stretch>
-        </p:blipFill>
-        <p:spPr>
-          <a:xfrm>
-            <a:off x="235128" y="28411501"/>
-            <a:ext cx="2195863" cy="1600438"/>
           </a:xfrm>
           <a:prstGeom prst="roundRect">
             <a:avLst>
@@ -18278,10 +17839,677 @@
         </p:xfrm>
         <a:graphic>
           <a:graphicData uri="http://schemas.openxmlformats.org/drawingml/2006/chart">
-            <c:chart xmlns:c="http://schemas.openxmlformats.org/drawingml/2006/chart" xmlns:r="http://schemas.openxmlformats.org/officeDocument/2006/relationships" r:id="rId20"/>
+            <c:chart xmlns:c="http://schemas.openxmlformats.org/drawingml/2006/chart" xmlns:r="http://schemas.openxmlformats.org/officeDocument/2006/relationships" r:id="rId19"/>
           </a:graphicData>
         </a:graphic>
       </p:graphicFrame>
+      <p:pic>
+        <p:nvPicPr>
+          <p:cNvPr id="7" name="Imagen 6">
+            <a:extLst>
+              <a:ext uri="{FF2B5EF4-FFF2-40B4-BE49-F238E27FC236}">
+                <a16:creationId xmlns:a16="http://schemas.microsoft.com/office/drawing/2014/main" id="{0E8C1B18-D784-4BFF-9E8A-1C3B8DBD67E6}"/>
+              </a:ext>
+            </a:extLst>
+          </p:cNvPr>
+          <p:cNvPicPr>
+            <a:picLocks noChangeAspect="1"/>
+          </p:cNvPicPr>
+          <p:nvPr/>
+        </p:nvPicPr>
+        <p:blipFill>
+          <a:blip r:embed="rId20"/>
+          <a:stretch>
+            <a:fillRect/>
+          </a:stretch>
+        </p:blipFill>
+        <p:spPr>
+          <a:xfrm>
+            <a:off x="18529513" y="2516956"/>
+            <a:ext cx="2659146" cy="1063658"/>
+          </a:xfrm>
+          <a:prstGeom prst="roundRect">
+            <a:avLst>
+              <a:gd name="adj" fmla="val 8594"/>
+            </a:avLst>
+          </a:prstGeom>
+          <a:solidFill>
+            <a:srgbClr val="FFFFFF">
+              <a:shade val="85000"/>
+            </a:srgbClr>
+          </a:solidFill>
+          <a:ln>
+            <a:noFill/>
+          </a:ln>
+          <a:effectLst>
+            <a:reflection blurRad="12700" stA="38000" endPos="28000" dist="5000" dir="5400000" sy="-100000" algn="bl" rotWithShape="0"/>
+          </a:effectLst>
+        </p:spPr>
+      </p:pic>
+      <p:pic>
+        <p:nvPicPr>
+          <p:cNvPr id="56" name="Picture 15">
+            <a:extLst>
+              <a:ext uri="{FF2B5EF4-FFF2-40B4-BE49-F238E27FC236}">
+                <a16:creationId xmlns:a16="http://schemas.microsoft.com/office/drawing/2014/main" id="{2E54DEB6-CA6E-4FD7-B296-91138EEF16E6}"/>
+              </a:ext>
+            </a:extLst>
+          </p:cNvPr>
+          <p:cNvPicPr>
+            <a:picLocks noChangeAspect="1"/>
+          </p:cNvPicPr>
+          <p:nvPr/>
+        </p:nvPicPr>
+        <p:blipFill>
+          <a:blip r:embed="rId21" cstate="print">
+            <a:extLst>
+              <a:ext uri="{28A0092B-C50C-407E-A947-70E740481C1C}">
+                <a14:useLocalDpi xmlns:a14="http://schemas.microsoft.com/office/drawing/2010/main" val="0"/>
+              </a:ext>
+            </a:extLst>
+          </a:blip>
+          <a:stretch>
+            <a:fillRect/>
+          </a:stretch>
+        </p:blipFill>
+        <p:spPr>
+          <a:xfrm>
+            <a:off x="165583" y="2519840"/>
+            <a:ext cx="1679853" cy="1224348"/>
+          </a:xfrm>
+          <a:prstGeom prst="roundRect">
+            <a:avLst>
+              <a:gd name="adj" fmla="val 8594"/>
+            </a:avLst>
+          </a:prstGeom>
+          <a:solidFill>
+            <a:srgbClr val="FFFFFF">
+              <a:shade val="85000"/>
+            </a:srgbClr>
+          </a:solidFill>
+          <a:ln>
+            <a:noFill/>
+          </a:ln>
+          <a:effectLst>
+            <a:reflection blurRad="12700" stA="38000" endPos="28000" dist="5000" dir="5400000" sy="-100000" algn="bl" rotWithShape="0"/>
+          </a:effectLst>
+        </p:spPr>
+      </p:pic>
+      <p:sp>
+        <p:nvSpPr>
+          <p:cNvPr id="58" name="Rectangle 57">
+            <a:extLst>
+              <a:ext uri="{FF2B5EF4-FFF2-40B4-BE49-F238E27FC236}">
+                <a16:creationId xmlns:a16="http://schemas.microsoft.com/office/drawing/2014/main" id="{E3FFBFE1-D895-4096-9C18-5EF37196B1EF}"/>
+              </a:ext>
+            </a:extLst>
+          </p:cNvPr>
+          <p:cNvSpPr/>
+          <p:nvPr/>
+        </p:nvSpPr>
+        <p:spPr>
+          <a:xfrm>
+            <a:off x="10338739" y="19509400"/>
+            <a:ext cx="11000382" cy="1200329"/>
+          </a:xfrm>
+          <a:prstGeom prst="rect">
+            <a:avLst/>
+          </a:prstGeom>
+        </p:spPr>
+        <p:txBody>
+          <a:bodyPr wrap="square">
+            <a:spAutoFit/>
+          </a:bodyPr>
+          <a:lstStyle/>
+          <a:p>
+            <a:pPr algn="just"/>
+            <a:r>
+              <a:rPr lang="es-MX" sz="1200" b="1" dirty="0">
+                <a:solidFill>
+                  <a:srgbClr val="002060"/>
+                </a:solidFill>
+                <a:latin typeface="+mj-lt"/>
+              </a:rPr>
+              <a:t>[1] Gray, J., Moore, K., &amp; </a:t>
+            </a:r>
+            <a:r>
+              <a:rPr lang="es-MX" sz="1200" b="1" dirty="0" err="1">
+                <a:solidFill>
+                  <a:srgbClr val="002060"/>
+                </a:solidFill>
+                <a:latin typeface="+mj-lt"/>
+              </a:rPr>
+              <a:t>Naylor</a:t>
+            </a:r>
+            <a:r>
+              <a:rPr lang="es-MX" sz="1200" b="1" dirty="0">
+                <a:solidFill>
+                  <a:srgbClr val="002060"/>
+                </a:solidFill>
+                <a:latin typeface="+mj-lt"/>
+              </a:rPr>
+              <a:t>, B. (2010, </a:t>
+            </a:r>
+            <a:r>
+              <a:rPr lang="es-MX" sz="1200" b="1" dirty="0" err="1">
+                <a:solidFill>
+                  <a:srgbClr val="002060"/>
+                </a:solidFill>
+                <a:latin typeface="+mj-lt"/>
+              </a:rPr>
+              <a:t>September</a:t>
+            </a:r>
+            <a:r>
+              <a:rPr lang="es-MX" sz="1200" b="1" dirty="0">
+                <a:solidFill>
+                  <a:srgbClr val="002060"/>
+                </a:solidFill>
+                <a:latin typeface="+mj-lt"/>
+              </a:rPr>
+              <a:t>). </a:t>
+            </a:r>
+            <a:r>
+              <a:rPr lang="es-MX" sz="1200" b="1" dirty="0" err="1">
+                <a:solidFill>
+                  <a:srgbClr val="002060"/>
+                </a:solidFill>
+                <a:latin typeface="+mj-lt"/>
+              </a:rPr>
+              <a:t>OpenMDAO</a:t>
+            </a:r>
+            <a:r>
+              <a:rPr lang="es-MX" sz="1200" b="1" dirty="0">
+                <a:solidFill>
+                  <a:srgbClr val="002060"/>
+                </a:solidFill>
+                <a:latin typeface="+mj-lt"/>
+              </a:rPr>
+              <a:t>: </a:t>
+            </a:r>
+            <a:r>
+              <a:rPr lang="es-MX" sz="1200" b="1" dirty="0" err="1">
+                <a:solidFill>
+                  <a:srgbClr val="002060"/>
+                </a:solidFill>
+                <a:latin typeface="+mj-lt"/>
+              </a:rPr>
+              <a:t>An</a:t>
+            </a:r>
+            <a:r>
+              <a:rPr lang="es-MX" sz="1200" b="1" dirty="0">
+                <a:solidFill>
+                  <a:srgbClr val="002060"/>
+                </a:solidFill>
+                <a:latin typeface="+mj-lt"/>
+              </a:rPr>
+              <a:t> open </a:t>
+            </a:r>
+            <a:r>
+              <a:rPr lang="es-MX" sz="1200" b="1" dirty="0" err="1">
+                <a:solidFill>
+                  <a:srgbClr val="002060"/>
+                </a:solidFill>
+                <a:latin typeface="+mj-lt"/>
+              </a:rPr>
+              <a:t>source</a:t>
+            </a:r>
+            <a:r>
+              <a:rPr lang="es-MX" sz="1200" b="1" dirty="0">
+                <a:solidFill>
+                  <a:srgbClr val="002060"/>
+                </a:solidFill>
+                <a:latin typeface="+mj-lt"/>
+              </a:rPr>
+              <a:t> </a:t>
+            </a:r>
+            <a:r>
+              <a:rPr lang="es-MX" sz="1200" b="1" dirty="0" err="1">
+                <a:solidFill>
+                  <a:srgbClr val="002060"/>
+                </a:solidFill>
+                <a:latin typeface="+mj-lt"/>
+              </a:rPr>
+              <a:t>framework</a:t>
+            </a:r>
+            <a:r>
+              <a:rPr lang="es-MX" sz="1200" b="1" dirty="0">
+                <a:solidFill>
+                  <a:srgbClr val="002060"/>
+                </a:solidFill>
+                <a:latin typeface="+mj-lt"/>
+              </a:rPr>
+              <a:t> </a:t>
+            </a:r>
+            <a:r>
+              <a:rPr lang="es-MX" sz="1200" b="1" dirty="0" err="1">
+                <a:solidFill>
+                  <a:srgbClr val="002060"/>
+                </a:solidFill>
+                <a:latin typeface="+mj-lt"/>
+              </a:rPr>
+              <a:t>for</a:t>
+            </a:r>
+            <a:r>
+              <a:rPr lang="es-MX" sz="1200" b="1" dirty="0">
+                <a:solidFill>
+                  <a:srgbClr val="002060"/>
+                </a:solidFill>
+                <a:latin typeface="+mj-lt"/>
+              </a:rPr>
+              <a:t> </a:t>
+            </a:r>
+            <a:r>
+              <a:rPr lang="es-MX" sz="1200" b="1" dirty="0" err="1">
+                <a:solidFill>
+                  <a:srgbClr val="002060"/>
+                </a:solidFill>
+                <a:latin typeface="+mj-lt"/>
+              </a:rPr>
+              <a:t>multidisciplinary</a:t>
+            </a:r>
+            <a:r>
+              <a:rPr lang="es-MX" sz="1200" b="1" dirty="0">
+                <a:solidFill>
+                  <a:srgbClr val="002060"/>
+                </a:solidFill>
+                <a:latin typeface="+mj-lt"/>
+              </a:rPr>
+              <a:t> </a:t>
+            </a:r>
+            <a:r>
+              <a:rPr lang="es-MX" sz="1200" b="1" dirty="0" err="1">
+                <a:solidFill>
+                  <a:srgbClr val="002060"/>
+                </a:solidFill>
+                <a:latin typeface="+mj-lt"/>
+              </a:rPr>
+              <a:t>analysis</a:t>
+            </a:r>
+            <a:r>
+              <a:rPr lang="es-MX" sz="1200" b="1" dirty="0">
+                <a:solidFill>
+                  <a:srgbClr val="002060"/>
+                </a:solidFill>
+                <a:latin typeface="+mj-lt"/>
+              </a:rPr>
+              <a:t> and </a:t>
+            </a:r>
+            <a:r>
+              <a:rPr lang="es-MX" sz="1200" b="1" dirty="0" err="1">
+                <a:solidFill>
+                  <a:srgbClr val="002060"/>
+                </a:solidFill>
+                <a:latin typeface="+mj-lt"/>
+              </a:rPr>
+              <a:t>optimization</a:t>
+            </a:r>
+            <a:r>
+              <a:rPr lang="es-MX" sz="1200" b="1" dirty="0">
+                <a:solidFill>
+                  <a:srgbClr val="002060"/>
+                </a:solidFill>
+                <a:latin typeface="+mj-lt"/>
+              </a:rPr>
+              <a:t>. In 13th AIAA/ISSMO </a:t>
+            </a:r>
+            <a:r>
+              <a:rPr lang="es-MX" sz="1200" b="1" dirty="0" err="1">
+                <a:solidFill>
+                  <a:srgbClr val="002060"/>
+                </a:solidFill>
+                <a:latin typeface="+mj-lt"/>
+              </a:rPr>
+              <a:t>Multidisciplinary</a:t>
+            </a:r>
+            <a:r>
+              <a:rPr lang="es-MX" sz="1200" b="1" dirty="0">
+                <a:solidFill>
+                  <a:srgbClr val="002060"/>
+                </a:solidFill>
+                <a:latin typeface="+mj-lt"/>
+              </a:rPr>
+              <a:t> </a:t>
+            </a:r>
+            <a:r>
+              <a:rPr lang="es-MX" sz="1200" b="1" dirty="0" err="1">
+                <a:solidFill>
+                  <a:srgbClr val="002060"/>
+                </a:solidFill>
+                <a:latin typeface="+mj-lt"/>
+              </a:rPr>
+              <a:t>Analysis</a:t>
+            </a:r>
+            <a:r>
+              <a:rPr lang="es-MX" sz="1200" b="1" dirty="0">
+                <a:solidFill>
+                  <a:srgbClr val="002060"/>
+                </a:solidFill>
+                <a:latin typeface="+mj-lt"/>
+              </a:rPr>
+              <a:t> </a:t>
+            </a:r>
+            <a:r>
+              <a:rPr lang="es-MX" sz="1200" b="1" dirty="0" err="1">
+                <a:solidFill>
+                  <a:srgbClr val="002060"/>
+                </a:solidFill>
+                <a:latin typeface="+mj-lt"/>
+              </a:rPr>
+              <a:t>Optimization</a:t>
+            </a:r>
+            <a:r>
+              <a:rPr lang="es-MX" sz="1200" b="1" dirty="0">
+                <a:solidFill>
+                  <a:srgbClr val="002060"/>
+                </a:solidFill>
+                <a:latin typeface="+mj-lt"/>
+              </a:rPr>
+              <a:t> </a:t>
+            </a:r>
+            <a:r>
+              <a:rPr lang="es-MX" sz="1200" b="1" dirty="0" err="1">
+                <a:solidFill>
+                  <a:srgbClr val="002060"/>
+                </a:solidFill>
+                <a:latin typeface="+mj-lt"/>
+              </a:rPr>
+              <a:t>Conference</a:t>
+            </a:r>
+            <a:r>
+              <a:rPr lang="es-MX" sz="1200" b="1" dirty="0">
+                <a:solidFill>
+                  <a:srgbClr val="002060"/>
+                </a:solidFill>
+                <a:latin typeface="+mj-lt"/>
+              </a:rPr>
+              <a:t> (p. 9101).</a:t>
+            </a:r>
+            <a:endParaRPr lang="en-US" sz="1200" b="1" dirty="0">
+              <a:solidFill>
+                <a:srgbClr val="002060"/>
+              </a:solidFill>
+              <a:latin typeface="+mn-lt"/>
+            </a:endParaRPr>
+          </a:p>
+          <a:p>
+            <a:r>
+              <a:rPr lang="en-GB" sz="1200" b="1" dirty="0">
+                <a:solidFill>
+                  <a:srgbClr val="002060"/>
+                </a:solidFill>
+                <a:latin typeface="+mn-lt"/>
+              </a:rPr>
+              <a:t>[2] </a:t>
+            </a:r>
+            <a:r>
+              <a:rPr lang="en-GB" sz="1200" b="1" dirty="0" err="1">
+                <a:solidFill>
+                  <a:srgbClr val="002060"/>
+                </a:solidFill>
+                <a:latin typeface="+mn-lt"/>
+              </a:rPr>
+              <a:t>Peherstorfer</a:t>
+            </a:r>
+            <a:r>
+              <a:rPr lang="en-GB" sz="1200" b="1" dirty="0">
+                <a:solidFill>
+                  <a:srgbClr val="002060"/>
+                </a:solidFill>
+                <a:latin typeface="+mn-lt"/>
+              </a:rPr>
+              <a:t>, B., Willcox, K., &amp; </a:t>
+            </a:r>
+            <a:r>
+              <a:rPr lang="en-GB" sz="1200" b="1" dirty="0" err="1">
+                <a:solidFill>
+                  <a:srgbClr val="002060"/>
+                </a:solidFill>
+                <a:latin typeface="+mn-lt"/>
+              </a:rPr>
+              <a:t>Gunzburger</a:t>
+            </a:r>
+            <a:r>
+              <a:rPr lang="en-GB" sz="1200" b="1" dirty="0">
+                <a:solidFill>
+                  <a:srgbClr val="002060"/>
+                </a:solidFill>
+                <a:latin typeface="+mn-lt"/>
+              </a:rPr>
+              <a:t>, M. (2018). Survey of </a:t>
+            </a:r>
+            <a:r>
+              <a:rPr lang="en-GB" sz="1200" b="1" dirty="0" err="1">
+                <a:solidFill>
+                  <a:srgbClr val="002060"/>
+                </a:solidFill>
+                <a:latin typeface="+mn-lt"/>
+              </a:rPr>
+              <a:t>multifidelity</a:t>
+            </a:r>
+            <a:r>
+              <a:rPr lang="en-GB" sz="1200" b="1" dirty="0">
+                <a:solidFill>
+                  <a:srgbClr val="002060"/>
+                </a:solidFill>
+                <a:latin typeface="+mn-lt"/>
+              </a:rPr>
+              <a:t> methods in uncertainty propagation, inference, and optimization. SIAM Review, 60(3),            550-591.</a:t>
+            </a:r>
+            <a:endParaRPr lang="en-US" sz="1200" b="1" dirty="0">
+              <a:solidFill>
+                <a:srgbClr val="002060"/>
+              </a:solidFill>
+              <a:latin typeface="+mn-lt"/>
+            </a:endParaRPr>
+          </a:p>
+          <a:p>
+            <a:pPr algn="just"/>
+            <a:r>
+              <a:rPr lang="es-MX" sz="1200" b="1" dirty="0">
+                <a:solidFill>
+                  <a:srgbClr val="002060"/>
+                </a:solidFill>
+                <a:latin typeface="+mn-lt"/>
+              </a:rPr>
+              <a:t>[3] Mas-Colomer, J. (2018). </a:t>
+            </a:r>
+            <a:r>
+              <a:rPr lang="es-MX" sz="1200" b="1" i="1" dirty="0" err="1">
+                <a:solidFill>
+                  <a:srgbClr val="002060"/>
+                </a:solidFill>
+                <a:latin typeface="+mn-lt"/>
+              </a:rPr>
+              <a:t>Aeroelastic</a:t>
+            </a:r>
+            <a:r>
+              <a:rPr lang="es-MX" sz="1200" b="1" i="1" dirty="0">
+                <a:solidFill>
+                  <a:srgbClr val="002060"/>
+                </a:solidFill>
+                <a:latin typeface="+mn-lt"/>
+              </a:rPr>
+              <a:t> </a:t>
+            </a:r>
+            <a:r>
+              <a:rPr lang="es-MX" sz="1200" b="1" i="1" dirty="0" err="1">
+                <a:solidFill>
+                  <a:srgbClr val="002060"/>
+                </a:solidFill>
+                <a:latin typeface="+mn-lt"/>
+              </a:rPr>
+              <a:t>Similarity</a:t>
+            </a:r>
+            <a:r>
+              <a:rPr lang="es-MX" sz="1200" b="1" i="1" dirty="0">
+                <a:solidFill>
+                  <a:srgbClr val="002060"/>
+                </a:solidFill>
+                <a:latin typeface="+mn-lt"/>
+              </a:rPr>
+              <a:t> </a:t>
+            </a:r>
+            <a:r>
+              <a:rPr lang="es-MX" sz="1200" b="1" i="1" dirty="0" err="1">
+                <a:solidFill>
+                  <a:srgbClr val="002060"/>
+                </a:solidFill>
+                <a:latin typeface="+mn-lt"/>
+              </a:rPr>
+              <a:t>of</a:t>
+            </a:r>
+            <a:r>
+              <a:rPr lang="es-MX" sz="1200" b="1" i="1" dirty="0">
+                <a:solidFill>
+                  <a:srgbClr val="002060"/>
+                </a:solidFill>
+                <a:latin typeface="+mn-lt"/>
+              </a:rPr>
+              <a:t> a Flight </a:t>
+            </a:r>
+            <a:r>
+              <a:rPr lang="es-MX" sz="1200" b="1" i="1" dirty="0" err="1">
+                <a:solidFill>
+                  <a:srgbClr val="002060"/>
+                </a:solidFill>
+                <a:latin typeface="+mn-lt"/>
+              </a:rPr>
+              <a:t>Demonstrator</a:t>
+            </a:r>
+            <a:r>
+              <a:rPr lang="es-MX" sz="1200" b="1" i="1" dirty="0">
+                <a:solidFill>
+                  <a:srgbClr val="002060"/>
+                </a:solidFill>
+                <a:latin typeface="+mn-lt"/>
+              </a:rPr>
+              <a:t> </a:t>
+            </a:r>
+            <a:r>
+              <a:rPr lang="es-MX" sz="1200" b="1" i="1" dirty="0" err="1">
+                <a:solidFill>
+                  <a:srgbClr val="002060"/>
+                </a:solidFill>
+                <a:latin typeface="+mn-lt"/>
+              </a:rPr>
+              <a:t>via</a:t>
+            </a:r>
+            <a:r>
+              <a:rPr lang="es-MX" sz="1200" b="1" i="1" dirty="0">
+                <a:solidFill>
+                  <a:srgbClr val="002060"/>
+                </a:solidFill>
+                <a:latin typeface="+mn-lt"/>
+              </a:rPr>
+              <a:t> </a:t>
+            </a:r>
+            <a:r>
+              <a:rPr lang="es-MX" sz="1200" b="1" i="1" dirty="0" err="1">
+                <a:solidFill>
+                  <a:srgbClr val="002060"/>
+                </a:solidFill>
+                <a:latin typeface="+mn-lt"/>
+              </a:rPr>
+              <a:t>Multidisciplinary</a:t>
+            </a:r>
+            <a:r>
+              <a:rPr lang="es-MX" sz="1200" b="1" i="1" dirty="0">
+                <a:solidFill>
+                  <a:srgbClr val="002060"/>
+                </a:solidFill>
+                <a:latin typeface="+mn-lt"/>
+              </a:rPr>
+              <a:t> </a:t>
+            </a:r>
+            <a:r>
+              <a:rPr lang="es-MX" sz="1200" b="1" i="1" dirty="0" err="1">
+                <a:solidFill>
+                  <a:srgbClr val="002060"/>
+                </a:solidFill>
+                <a:latin typeface="+mn-lt"/>
+              </a:rPr>
+              <a:t>Optimization</a:t>
+            </a:r>
+            <a:r>
+              <a:rPr lang="es-MX" sz="1200" b="1" dirty="0">
+                <a:solidFill>
+                  <a:srgbClr val="002060"/>
+                </a:solidFill>
+                <a:latin typeface="+mn-lt"/>
+              </a:rPr>
+              <a:t> (Doctoral </a:t>
+            </a:r>
+            <a:r>
+              <a:rPr lang="es-MX" sz="1200" b="1" dirty="0" err="1">
+                <a:solidFill>
+                  <a:srgbClr val="002060"/>
+                </a:solidFill>
+                <a:latin typeface="+mn-lt"/>
+              </a:rPr>
+              <a:t>dissertation</a:t>
+            </a:r>
+            <a:r>
+              <a:rPr lang="es-MX" sz="1200" b="1" dirty="0">
+                <a:solidFill>
+                  <a:srgbClr val="002060"/>
+                </a:solidFill>
+                <a:latin typeface="+mn-lt"/>
+              </a:rPr>
+              <a:t>, </a:t>
+            </a:r>
+            <a:r>
+              <a:rPr lang="es-MX" sz="1200" b="1" dirty="0" err="1">
+                <a:solidFill>
+                  <a:srgbClr val="002060"/>
+                </a:solidFill>
+                <a:latin typeface="+mn-lt"/>
+              </a:rPr>
+              <a:t>Université</a:t>
+            </a:r>
+            <a:r>
+              <a:rPr lang="es-MX" sz="1200" b="1" dirty="0">
+                <a:solidFill>
+                  <a:srgbClr val="002060"/>
+                </a:solidFill>
+                <a:latin typeface="+mn-lt"/>
+              </a:rPr>
+              <a:t> </a:t>
+            </a:r>
+            <a:r>
+              <a:rPr lang="es-MX" sz="1200" b="1" dirty="0" err="1">
+                <a:solidFill>
+                  <a:srgbClr val="002060"/>
+                </a:solidFill>
+                <a:latin typeface="+mn-lt"/>
+              </a:rPr>
+              <a:t>Fédérale</a:t>
+            </a:r>
+            <a:r>
+              <a:rPr lang="es-MX" sz="1200" b="1" dirty="0">
+                <a:solidFill>
+                  <a:srgbClr val="002060"/>
+                </a:solidFill>
+                <a:latin typeface="+mn-lt"/>
+              </a:rPr>
+              <a:t> de Toulouse).</a:t>
+            </a:r>
+            <a:endParaRPr lang="en-US" sz="1200" b="1" dirty="0">
+              <a:solidFill>
+                <a:srgbClr val="002060"/>
+              </a:solidFill>
+              <a:latin typeface="+mn-lt"/>
+            </a:endParaRPr>
+          </a:p>
+          <a:p>
+            <a:endParaRPr lang="en-US" sz="1200" dirty="0">
+              <a:solidFill>
+                <a:srgbClr val="002060"/>
+              </a:solidFill>
+              <a:latin typeface="+mj-lt"/>
+            </a:endParaRPr>
+          </a:p>
+        </p:txBody>
+      </p:sp>
     </p:spTree>
     <p:extLst>
       <p:ext uri="{BB962C8B-B14F-4D97-AF65-F5344CB8AC3E}">

</xml_diff>

<commit_message>
Correction to MDAO tutorials and minor corrections to the poster.
</commit_message>
<xml_diff>
--- a/S3 Poster/Multifidelity aeroelastic optimization with application to a BWB.pptx
+++ b/S3 Poster/Multifidelity aeroelastic optimization with application to a BWB.pptx
@@ -5186,7 +5186,7 @@
       <dsp:spPr>
         <a:xfrm>
           <a:off x="2239844" y="547464"/>
-          <a:ext cx="4362038" cy="4362038"/>
+          <a:ext cx="4362039" cy="4362039"/>
         </a:xfrm>
         <a:custGeom>
           <a:avLst/>
@@ -5197,9 +5197,9 @@
           <a:pathLst>
             <a:path>
               <a:moveTo>
-                <a:pt x="3245729" y="277539"/>
+                <a:pt x="3245730" y="277539"/>
               </a:moveTo>
-              <a:arcTo wR="2181019" hR="2181019" stAng="17953226" swAng="1211870"/>
+              <a:arcTo wR="2181019" hR="2181019" stAng="17953226" swAng="1211871"/>
             </a:path>
           </a:pathLst>
         </a:custGeom>
@@ -5316,7 +5316,7 @@
       <dsp:spPr>
         <a:xfrm>
           <a:off x="2239844" y="547464"/>
-          <a:ext cx="4362038" cy="4362038"/>
+          <a:ext cx="4362039" cy="4362039"/>
         </a:xfrm>
         <a:custGeom>
           <a:avLst/>
@@ -5368,7 +5368,7 @@
       </dsp:nvSpPr>
       <dsp:spPr>
         <a:xfrm>
-          <a:off x="4863129" y="3947156"/>
+          <a:off x="4863129" y="3947157"/>
           <a:ext cx="1679410" cy="1091616"/>
         </a:xfrm>
         <a:prstGeom prst="roundRect">
@@ -5454,7 +5454,7 @@
         </a:p>
       </dsp:txBody>
       <dsp:txXfrm>
-        <a:off x="4916417" y="4000444"/>
+        <a:off x="4916417" y="4000445"/>
         <a:ext cx="1572834" cy="985040"/>
       </dsp:txXfrm>
     </dsp:sp>
@@ -5466,7 +5466,7 @@
       <dsp:spPr>
         <a:xfrm>
           <a:off x="2239844" y="547464"/>
-          <a:ext cx="4362038" cy="4362038"/>
+          <a:ext cx="4362039" cy="4362039"/>
         </a:xfrm>
         <a:custGeom>
           <a:avLst/>
@@ -5477,7 +5477,7 @@
           <a:pathLst>
             <a:path>
               <a:moveTo>
-                <a:pt x="2448789" y="4345538"/>
+                <a:pt x="2448790" y="4345539"/>
               </a:moveTo>
               <a:arcTo wR="2181019" hR="2181019" stAng="4976869" swAng="846261"/>
             </a:path>
@@ -5518,7 +5518,7 @@
       </dsp:nvSpPr>
       <dsp:spPr>
         <a:xfrm>
-          <a:off x="2299188" y="3947156"/>
+          <a:off x="2299187" y="3947157"/>
           <a:ext cx="1679410" cy="1091616"/>
         </a:xfrm>
         <a:prstGeom prst="roundRect">
@@ -5610,7 +5610,7 @@
         </a:p>
       </dsp:txBody>
       <dsp:txXfrm>
-        <a:off x="2352476" y="4000444"/>
+        <a:off x="2352475" y="4000445"/>
         <a:ext cx="1572834" cy="985040"/>
       </dsp:txXfrm>
     </dsp:sp>
@@ -5622,7 +5622,7 @@
       <dsp:spPr>
         <a:xfrm>
           <a:off x="2239844" y="547464"/>
-          <a:ext cx="4362038" cy="4362038"/>
+          <a:ext cx="4362039" cy="4362039"/>
         </a:xfrm>
         <a:custGeom>
           <a:avLst/>
@@ -5633,7 +5633,7 @@
           <a:pathLst>
             <a:path>
               <a:moveTo>
-                <a:pt x="231430" y="3158744"/>
+                <a:pt x="231430" y="3158745"/>
               </a:moveTo>
               <a:arcTo wR="2181019" hR="2181019" stAng="9201964" swAng="1359983"/>
             </a:path>
@@ -5772,7 +5772,7 @@
       <dsp:spPr>
         <a:xfrm>
           <a:off x="2239844" y="547464"/>
-          <a:ext cx="4362038" cy="4362038"/>
+          <a:ext cx="4362039" cy="4362039"/>
         </a:xfrm>
         <a:custGeom>
           <a:avLst/>
@@ -5785,7 +5785,7 @@
               <a:moveTo>
                 <a:pt x="524581" y="762196"/>
               </a:moveTo>
-              <a:arcTo wR="2181019" hR="2181019" stAng="13234903" swAng="1211870"/>
+              <a:arcTo wR="2181019" hR="2181019" stAng="13234903" swAng="1211871"/>
             </a:path>
           </a:pathLst>
         </a:custGeom>
@@ -5937,7 +5937,7 @@
       <dsp:spPr>
         <a:xfrm>
           <a:off x="2813031" y="548934"/>
-          <a:ext cx="3619223" cy="3619223"/>
+          <a:ext cx="3619224" cy="3619224"/>
         </a:xfrm>
         <a:custGeom>
           <a:avLst/>
@@ -5950,7 +5950,7 @@
               <a:moveTo>
                 <a:pt x="2884382" y="353739"/>
               </a:moveTo>
-              <a:arcTo wR="1809611" hR="1809611" stAng="18386155" swAng="1635116"/>
+              <a:arcTo wR="1809612" hR="1809612" stAng="18386155" swAng="1635117"/>
             </a:path>
           </a:pathLst>
         </a:custGeom>
@@ -6087,7 +6087,7 @@
       <dsp:spPr>
         <a:xfrm>
           <a:off x="2813031" y="548934"/>
-          <a:ext cx="3619223" cy="3619223"/>
+          <a:ext cx="3619224" cy="3619224"/>
         </a:xfrm>
         <a:custGeom>
           <a:avLst/>
@@ -6098,9 +6098,9 @@
           <a:pathLst>
             <a:path>
               <a:moveTo>
-                <a:pt x="3431734" y="2611742"/>
+                <a:pt x="3431734" y="2611743"/>
               </a:moveTo>
-              <a:arcTo wR="1809611" hR="1809611" stAng="1578729" swAng="1635116"/>
+              <a:arcTo wR="1809612" hR="1809612" stAng="1578729" swAng="1635117"/>
             </a:path>
           </a:pathLst>
         </a:custGeom>
@@ -6139,7 +6139,7 @@
       </dsp:nvSpPr>
       <dsp:spPr>
         <a:xfrm>
-          <a:off x="3780726" y="3620912"/>
+          <a:off x="3780726" y="3620913"/>
           <a:ext cx="1683834" cy="1094492"/>
         </a:xfrm>
         <a:prstGeom prst="roundRect">
@@ -6231,7 +6231,7 @@
         </a:p>
       </dsp:txBody>
       <dsp:txXfrm>
-        <a:off x="3834155" y="3674341"/>
+        <a:off x="3834155" y="3674342"/>
         <a:ext cx="1576976" cy="987634"/>
       </dsp:txXfrm>
     </dsp:sp>
@@ -6243,7 +6243,7 @@
       <dsp:spPr>
         <a:xfrm>
           <a:off x="2813031" y="548934"/>
-          <a:ext cx="3619223" cy="3619223"/>
+          <a:ext cx="3619224" cy="3619224"/>
         </a:xfrm>
         <a:custGeom>
           <a:avLst/>
@@ -6254,9 +6254,9 @@
           <a:pathLst>
             <a:path>
               <a:moveTo>
-                <a:pt x="734841" y="3265483"/>
+                <a:pt x="734841" y="3265484"/>
               </a:moveTo>
-              <a:arcTo wR="1809611" hR="1809611" stAng="7586155" swAng="1635116"/>
+              <a:arcTo wR="1809612" hR="1809612" stAng="7586155" swAng="1635117"/>
             </a:path>
           </a:pathLst>
         </a:custGeom>
@@ -6393,7 +6393,7 @@
       <dsp:spPr>
         <a:xfrm>
           <a:off x="2813031" y="548934"/>
-          <a:ext cx="3619223" cy="3619223"/>
+          <a:ext cx="3619224" cy="3619224"/>
         </a:xfrm>
         <a:custGeom>
           <a:avLst/>
@@ -6406,7 +6406,7 @@
               <a:moveTo>
                 <a:pt x="187489" y="1007481"/>
               </a:moveTo>
-              <a:arcTo wR="1809611" hR="1809611" stAng="12378729" swAng="1635116"/>
+              <a:arcTo wR="1809612" hR="1809612" stAng="12378729" swAng="1635117"/>
             </a:path>
           </a:pathLst>
         </a:custGeom>
@@ -11333,7 +11333,7 @@
               <a:pPr>
                 <a:defRPr/>
               </a:pPr>
-              <a:t>15/10/2019</a:t>
+              <a:t>06/02/2020</a:t>
             </a:fld>
             <a:endParaRPr lang="pt-BR"/>
           </a:p>
@@ -11546,7 +11546,7 @@
               <a:pPr>
                 <a:defRPr/>
               </a:pPr>
-              <a:t>15/10/2019</a:t>
+              <a:t>06/02/2020</a:t>
             </a:fld>
             <a:endParaRPr lang="pt-BR"/>
           </a:p>
@@ -11769,7 +11769,7 @@
               <a:pPr>
                 <a:defRPr/>
               </a:pPr>
-              <a:t>15/10/2019</a:t>
+              <a:t>06/02/2020</a:t>
             </a:fld>
             <a:endParaRPr lang="pt-BR"/>
           </a:p>
@@ -11982,7 +11982,7 @@
               <a:pPr>
                 <a:defRPr/>
               </a:pPr>
-              <a:t>15/10/2019</a:t>
+              <a:t>06/02/2020</a:t>
             </a:fld>
             <a:endParaRPr lang="pt-BR"/>
           </a:p>
@@ -12272,7 +12272,7 @@
               <a:pPr>
                 <a:defRPr/>
               </a:pPr>
-              <a:t>15/10/2019</a:t>
+              <a:t>06/02/2020</a:t>
             </a:fld>
             <a:endParaRPr lang="pt-BR"/>
           </a:p>
@@ -12602,7 +12602,7 @@
               <a:pPr>
                 <a:defRPr/>
               </a:pPr>
-              <a:t>15/10/2019</a:t>
+              <a:t>06/02/2020</a:t>
             </a:fld>
             <a:endParaRPr lang="pt-BR"/>
           </a:p>
@@ -13071,7 +13071,7 @@
               <a:pPr>
                 <a:defRPr/>
               </a:pPr>
-              <a:t>15/10/2019</a:t>
+              <a:t>06/02/2020</a:t>
             </a:fld>
             <a:endParaRPr lang="pt-BR"/>
           </a:p>
@@ -13233,7 +13233,7 @@
               <a:pPr>
                 <a:defRPr/>
               </a:pPr>
-              <a:t>15/10/2019</a:t>
+              <a:t>06/02/2020</a:t>
             </a:fld>
             <a:endParaRPr lang="pt-BR"/>
           </a:p>
@@ -13373,7 +13373,7 @@
               <a:pPr>
                 <a:defRPr/>
               </a:pPr>
-              <a:t>15/10/2019</a:t>
+              <a:t>06/02/2020</a:t>
             </a:fld>
             <a:endParaRPr lang="pt-BR"/>
           </a:p>
@@ -13693,7 +13693,7 @@
               <a:pPr>
                 <a:defRPr/>
               </a:pPr>
-              <a:t>15/10/2019</a:t>
+              <a:t>06/02/2020</a:t>
             </a:fld>
             <a:endParaRPr lang="pt-BR"/>
           </a:p>
@@ -13993,7 +13993,7 @@
               <a:pPr>
                 <a:defRPr/>
               </a:pPr>
-              <a:t>15/10/2019</a:t>
+              <a:t>06/02/2020</a:t>
             </a:fld>
             <a:endParaRPr lang="pt-BR"/>
           </a:p>
@@ -14318,7 +14318,7 @@
               <a:pPr>
                 <a:defRPr/>
               </a:pPr>
-              <a:t>15/10/2019</a:t>
+              <a:t>06/02/2020</a:t>
             </a:fld>
             <a:endParaRPr lang="pt-BR"/>
           </a:p>
@@ -15860,10 +15860,10 @@
         </p:nvGrpSpPr>
         <p:grpSpPr>
           <a:xfrm>
-            <a:off x="-679102" y="20067708"/>
-            <a:ext cx="19107407" cy="10187609"/>
-            <a:chOff x="1152264" y="19938300"/>
-            <a:chExt cx="19065469" cy="10187609"/>
+            <a:off x="-679102" y="20165487"/>
+            <a:ext cx="19107407" cy="10089830"/>
+            <a:chOff x="1152264" y="20036079"/>
+            <a:chExt cx="19065469" cy="10089830"/>
           </a:xfrm>
         </p:grpSpPr>
         <p:grpSp>
@@ -15880,10 +15880,10 @@
           </p:nvGrpSpPr>
           <p:grpSpPr>
             <a:xfrm>
-              <a:off x="1152264" y="19938300"/>
-              <a:ext cx="15591074" cy="9725944"/>
-              <a:chOff x="-397250" y="-143643"/>
-              <a:chExt cx="11149333" cy="7039559"/>
+              <a:off x="1152264" y="20036079"/>
+              <a:ext cx="15591074" cy="9628165"/>
+              <a:chOff x="-397250" y="-72871"/>
+              <a:chExt cx="11149333" cy="6968787"/>
             </a:xfrm>
           </p:grpSpPr>
           <p:sp>
@@ -16256,8 +16256,8 @@
             </p:nvSpPr>
             <p:spPr>
               <a:xfrm>
-                <a:off x="1240049" y="-143643"/>
-                <a:ext cx="3602355" cy="423255"/>
+                <a:off x="1240049" y="-72871"/>
+                <a:ext cx="4374233" cy="423255"/>
               </a:xfrm>
               <a:prstGeom prst="rect">
                 <a:avLst/>
@@ -16296,6 +16296,24 @@
                     <a:latin typeface="Georgia" panose="02040502050405020303" pitchFamily="18" charset="0"/>
                   </a:rPr>
                   <a:t>CDi</a:t>
+                </a:r>
+                <a:r>
+                  <a:rPr lang="es-MX" sz="3200" dirty="0">
+                    <a:solidFill>
+                      <a:srgbClr val="002060"/>
+                    </a:solidFill>
+                    <a:latin typeface="Georgia" panose="02040502050405020303" pitchFamily="18" charset="0"/>
+                  </a:rPr>
+                  <a:t>/</a:t>
+                </a:r>
+                <a:r>
+                  <a:rPr lang="es-MX" sz="3200" dirty="0" err="1">
+                    <a:solidFill>
+                      <a:srgbClr val="002060"/>
+                    </a:solidFill>
+                    <a:latin typeface="Georgia" panose="02040502050405020303" pitchFamily="18" charset="0"/>
+                  </a:rPr>
+                  <a:t>Breguet</a:t>
                 </a:r>
                 <a:r>
                   <a:rPr lang="es-MX" sz="3200" dirty="0">

</xml_diff>